<commit_message>
Update Capstone Design 4th Presentation.pptx
</commit_message>
<xml_diff>
--- a/Weekly Presentation/Capstone Design 4th Presentation.pptx
+++ b/Weekly Presentation/Capstone Design 4th Presentation.pptx
@@ -5,10 +5,10 @@
     <p:sldMasterId id="2147483708" r:id="rId1"/>
   </p:sldMasterIdLst>
   <p:notesMasterIdLst>
-    <p:notesMasterId r:id="rId30"/>
+    <p:notesMasterId r:id="rId31"/>
   </p:notesMasterIdLst>
   <p:handoutMasterIdLst>
-    <p:handoutMasterId r:id="rId31"/>
+    <p:handoutMasterId r:id="rId32"/>
   </p:handoutMasterIdLst>
   <p:sldIdLst>
     <p:sldId id="259" r:id="rId2"/>
@@ -32,13 +32,14 @@
     <p:sldId id="323" r:id="rId20"/>
     <p:sldId id="326" r:id="rId21"/>
     <p:sldId id="327" r:id="rId22"/>
-    <p:sldId id="328" r:id="rId23"/>
-    <p:sldId id="329" r:id="rId24"/>
-    <p:sldId id="330" r:id="rId25"/>
-    <p:sldId id="306" r:id="rId26"/>
-    <p:sldId id="307" r:id="rId27"/>
-    <p:sldId id="308" r:id="rId28"/>
-    <p:sldId id="304" r:id="rId29"/>
+    <p:sldId id="331" r:id="rId23"/>
+    <p:sldId id="332" r:id="rId24"/>
+    <p:sldId id="333" r:id="rId25"/>
+    <p:sldId id="334" r:id="rId26"/>
+    <p:sldId id="306" r:id="rId27"/>
+    <p:sldId id="307" r:id="rId28"/>
+    <p:sldId id="308" r:id="rId29"/>
+    <p:sldId id="304" r:id="rId30"/>
   </p:sldIdLst>
   <p:sldSz cx="12192000" cy="6858000"/>
   <p:notesSz cx="6858000" cy="9144000"/>
@@ -162,8 +163,8 @@
 <file path=ppt/revisionInfo.xml><?xml version="1.0" encoding="utf-8"?>
 <p1510:revInfo xmlns:a="http://schemas.openxmlformats.org/drawingml/2006/main" xmlns:r="http://schemas.openxmlformats.org/officeDocument/2006/relationships" xmlns:p1510="http://schemas.microsoft.com/office/powerpoint/2015/10/main">
   <p1510:revLst>
+    <p1510:client id="{4566671B-B4E5-49D2-985A-4643566D0901}" v="1617" dt="2019-03-17T02:19:14.877"/>
     <p1510:client id="{4F0399D9-1F0D-4023-B5B9-80CB22EBE9A2}" v="70" dt="2019-03-17T12:28:33.775"/>
-    <p1510:client id="{4566671B-B4E5-49D2-985A-4643566D0901}" v="1617" dt="2019-03-17T02:19:14.877"/>
     <p1510:client id="{160262F4-0A74-4E2D-A724-7C6BD9C4D9C3}" v="66" dt="2019-03-17T12:31:58.431"/>
   </p1510:revLst>
 </p1510:revInfo>
@@ -4628,7 +4629,7 @@
           <a:p>
             <a:pPr algn="ctr"/>
             <a:r>
-              <a:rPr lang="en-US" altLang="ko-KR" sz="7200" b="1" spc="-300">
+              <a:rPr lang="en-US" altLang="ko-KR" sz="7200" b="1" spc="-300" dirty="0">
                 <a:solidFill>
                   <a:schemeClr val="accent1">
                     <a:alpha val="70000"/>
@@ -4638,7 +4639,7 @@
               <a:t> </a:t>
             </a:r>
             <a:r>
-              <a:rPr lang="en-US" altLang="ko-KR" sz="8000" b="1" spc="-300">
+              <a:rPr lang="en-US" altLang="ko-KR" sz="8000" b="1" spc="-300" dirty="0">
                 <a:solidFill>
                   <a:schemeClr val="accent1">
                     <a:alpha val="70000"/>
@@ -4647,7 +4648,7 @@
               </a:rPr>
               <a:t>Capstone Design</a:t>
             </a:r>
-            <a:endParaRPr lang="ko-KR" altLang="en-US" sz="8000" b="1" spc="-300">
+            <a:endParaRPr lang="ko-KR" altLang="en-US" sz="8000" b="1" spc="-300" dirty="0">
               <a:solidFill>
                 <a:schemeClr val="accent1">
                   <a:alpha val="70000"/>
@@ -4687,7 +4688,7 @@
           <a:p>
             <a:pPr algn="ctr"/>
             <a:r>
-              <a:rPr lang="en-US" altLang="ko-KR" sz="3000" spc="-300">
+              <a:rPr lang="en-US" altLang="ko-KR" sz="3000" spc="-300" dirty="0">
                 <a:solidFill>
                   <a:schemeClr val="tx1">
                     <a:alpha val="70000"/>
@@ -4700,7 +4701,7 @@
           <a:p>
             <a:pPr algn="ctr"/>
             <a:r>
-              <a:rPr lang="en-US" altLang="ko-KR" sz="3000" spc="-300">
+              <a:rPr lang="en-US" altLang="ko-KR" sz="3000" spc="-300" dirty="0">
                 <a:solidFill>
                   <a:schemeClr val="tx1">
                     <a:alpha val="70000"/>
@@ -4713,16 +4714,26 @@
           <a:p>
             <a:pPr algn="ctr"/>
             <a:r>
-              <a:rPr lang="en-US" altLang="ko-KR" sz="3000" spc="-300">
+              <a:rPr lang="en-US" altLang="ko-KR" sz="3000" b="1" spc="-300" dirty="0">
                 <a:solidFill>
                   <a:schemeClr val="tx1">
                     <a:alpha val="70000"/>
                   </a:schemeClr>
                 </a:solidFill>
               </a:rPr>
-              <a:t>20164245 </a:t>
+              <a:t>20164245</a:t>
             </a:r>
-            <a:endParaRPr lang="ko-KR" altLang="en-US" sz="3000" spc="-300">
+            <a:r>
+              <a:rPr lang="en-US" altLang="ko-KR" sz="3000" spc="-300" dirty="0">
+                <a:solidFill>
+                  <a:schemeClr val="tx1">
+                    <a:alpha val="70000"/>
+                  </a:schemeClr>
+                </a:solidFill>
+              </a:rPr>
+              <a:t> </a:t>
+            </a:r>
+            <a:endParaRPr lang="ko-KR" altLang="en-US" sz="3000" spc="-300" dirty="0">
               <a:solidFill>
                 <a:schemeClr val="tx1">
                   <a:alpha val="70000"/>
@@ -4761,7 +4772,7 @@
           <a:lstStyle/>
           <a:p>
             <a:r>
-              <a:rPr lang="en-US" altLang="ko-KR" sz="3000" spc="-300">
+              <a:rPr lang="en-US" altLang="ko-KR" sz="3000" spc="-300" dirty="0">
                 <a:solidFill>
                   <a:schemeClr val="tx1">
                     <a:alpha val="70000"/>
@@ -4771,7 +4782,7 @@
               <a:t>Park </a:t>
             </a:r>
             <a:r>
-              <a:rPr lang="en-US" altLang="ko-KR" sz="3000" spc="-300" err="1">
+              <a:rPr lang="en-US" altLang="ko-KR" sz="3000" spc="-300" dirty="0" err="1">
                 <a:solidFill>
                   <a:schemeClr val="tx1">
                     <a:alpha val="70000"/>
@@ -4780,7 +4791,7 @@
               </a:rPr>
               <a:t>JuHyeon</a:t>
             </a:r>
-            <a:endParaRPr lang="en-US" altLang="ko-KR" sz="3000" spc="-300">
+            <a:endParaRPr lang="en-US" altLang="ko-KR" sz="3000" spc="-300" dirty="0">
               <a:solidFill>
                 <a:schemeClr val="tx1">
                   <a:alpha val="70000"/>
@@ -4790,7 +4801,7 @@
           </a:p>
           <a:p>
             <a:r>
-              <a:rPr lang="en-US" altLang="ko-KR" sz="3000" spc="-300" err="1">
+              <a:rPr lang="en-US" altLang="ko-KR" sz="3000" spc="-300" dirty="0" err="1">
                 <a:solidFill>
                   <a:schemeClr val="tx1">
                     <a:alpha val="70000"/>
@@ -4800,7 +4811,7 @@
               <a:t>Heo</a:t>
             </a:r>
             <a:r>
-              <a:rPr lang="ko-KR" altLang="en-US" sz="3000" spc="-300">
+              <a:rPr lang="ko-KR" altLang="en-US" sz="3000" spc="-300" dirty="0">
                 <a:solidFill>
                   <a:schemeClr val="tx1">
                     <a:alpha val="70000"/>
@@ -4810,7 +4821,7 @@
               <a:t> </a:t>
             </a:r>
             <a:r>
-              <a:rPr lang="en-US" altLang="ko-KR" sz="3000" spc="-300" err="1">
+              <a:rPr lang="en-US" altLang="ko-KR" sz="3000" spc="-300" dirty="0" err="1">
                 <a:solidFill>
                   <a:schemeClr val="tx1">
                     <a:alpha val="70000"/>
@@ -4819,7 +4830,7 @@
               </a:rPr>
               <a:t>JeongWoo</a:t>
             </a:r>
-            <a:endParaRPr lang="en-US" altLang="ko-KR" sz="3000" spc="-300">
+            <a:endParaRPr lang="en-US" altLang="ko-KR" sz="3000" spc="-300" dirty="0">
               <a:solidFill>
                 <a:schemeClr val="tx1">
                   <a:alpha val="70000"/>
@@ -4829,7 +4840,7 @@
           </a:p>
           <a:p>
             <a:r>
-              <a:rPr lang="en-US" altLang="ko-KR" sz="3000" spc="-300">
+              <a:rPr lang="en-US" altLang="ko-KR" sz="3000" b="1" spc="-300" dirty="0">
                 <a:solidFill>
                   <a:schemeClr val="tx1">
                     <a:alpha val="70000"/>
@@ -4838,7 +4849,7 @@
               </a:rPr>
               <a:t>Hong Jin</a:t>
             </a:r>
-            <a:endParaRPr lang="ko-KR" altLang="en-US" sz="3000"/>
+            <a:endParaRPr lang="ko-KR" altLang="en-US" sz="3000" b="1" dirty="0"/>
           </a:p>
         </p:txBody>
       </p:sp>
@@ -4904,7 +4915,7 @@
 </file>
 
 <file path=ppt/slides/slide10.xml><?xml version="1.0" encoding="utf-8"?>
-<p:sld xmlns:a="http://schemas.openxmlformats.org/drawingml/2006/main" xmlns:r="http://schemas.openxmlformats.org/officeDocument/2006/relationships" xmlns:p="http://schemas.openxmlformats.org/presentationml/2006/main">
+<p:sld xmlns:a="http://schemas.openxmlformats.org/drawingml/2006/main" xmlns:r="http://schemas.openxmlformats.org/officeDocument/2006/relationships" xmlns:p="http://schemas.openxmlformats.org/presentationml/2006/main" showMasterSp="0">
   <p:cSld>
     <p:spTree>
       <p:nvGrpSpPr>
@@ -5678,7 +5689,7 @@
 </file>
 
 <file path=ppt/slides/slide11.xml><?xml version="1.0" encoding="utf-8"?>
-<p:sld xmlns:a="http://schemas.openxmlformats.org/drawingml/2006/main" xmlns:r="http://schemas.openxmlformats.org/officeDocument/2006/relationships" xmlns:p="http://schemas.openxmlformats.org/presentationml/2006/main">
+<p:sld xmlns:a="http://schemas.openxmlformats.org/drawingml/2006/main" xmlns:r="http://schemas.openxmlformats.org/officeDocument/2006/relationships" xmlns:p="http://schemas.openxmlformats.org/presentationml/2006/main" showMasterSp="0">
   <p:cSld>
     <p:spTree>
       <p:nvGrpSpPr>
@@ -6621,7 +6632,7 @@
 </file>
 
 <file path=ppt/slides/slide12.xml><?xml version="1.0" encoding="utf-8"?>
-<p:sld xmlns:a="http://schemas.openxmlformats.org/drawingml/2006/main" xmlns:r="http://schemas.openxmlformats.org/officeDocument/2006/relationships" xmlns:p="http://schemas.openxmlformats.org/presentationml/2006/main">
+<p:sld xmlns:a="http://schemas.openxmlformats.org/drawingml/2006/main" xmlns:r="http://schemas.openxmlformats.org/officeDocument/2006/relationships" xmlns:p="http://schemas.openxmlformats.org/presentationml/2006/main" showMasterSp="0">
   <p:cSld>
     <p:spTree>
       <p:nvGrpSpPr>
@@ -7585,7 +7596,7 @@
 </file>
 
 <file path=ppt/slides/slide13.xml><?xml version="1.0" encoding="utf-8"?>
-<p:sld xmlns:a="http://schemas.openxmlformats.org/drawingml/2006/main" xmlns:r="http://schemas.openxmlformats.org/officeDocument/2006/relationships" xmlns:p="http://schemas.openxmlformats.org/presentationml/2006/main">
+<p:sld xmlns:a="http://schemas.openxmlformats.org/drawingml/2006/main" xmlns:r="http://schemas.openxmlformats.org/officeDocument/2006/relationships" xmlns:p="http://schemas.openxmlformats.org/presentationml/2006/main" showMasterSp="0">
   <p:cSld>
     <p:spTree>
       <p:nvGrpSpPr>
@@ -8602,7 +8613,7 @@
 </file>
 
 <file path=ppt/slides/slide14.xml><?xml version="1.0" encoding="utf-8"?>
-<p:sld xmlns:a="http://schemas.openxmlformats.org/drawingml/2006/main" xmlns:r="http://schemas.openxmlformats.org/officeDocument/2006/relationships" xmlns:p="http://schemas.openxmlformats.org/presentationml/2006/main">
+<p:sld xmlns:a="http://schemas.openxmlformats.org/drawingml/2006/main" xmlns:r="http://schemas.openxmlformats.org/officeDocument/2006/relationships" xmlns:p="http://schemas.openxmlformats.org/presentationml/2006/main" showMasterSp="0">
   <p:cSld>
     <p:spTree>
       <p:nvGrpSpPr>
@@ -9809,7 +9820,7 @@
 </file>
 
 <file path=ppt/slides/slide15.xml><?xml version="1.0" encoding="utf-8"?>
-<p:sld xmlns:a="http://schemas.openxmlformats.org/drawingml/2006/main" xmlns:r="http://schemas.openxmlformats.org/officeDocument/2006/relationships" xmlns:p="http://schemas.openxmlformats.org/presentationml/2006/main">
+<p:sld xmlns:a="http://schemas.openxmlformats.org/drawingml/2006/main" xmlns:r="http://schemas.openxmlformats.org/officeDocument/2006/relationships" xmlns:p="http://schemas.openxmlformats.org/presentationml/2006/main" showMasterSp="0">
   <p:cSld>
     <p:spTree>
       <p:nvGrpSpPr>
@@ -11052,7 +11063,7 @@
 </file>
 
 <file path=ppt/slides/slide16.xml><?xml version="1.0" encoding="utf-8"?>
-<p:sld xmlns:a="http://schemas.openxmlformats.org/drawingml/2006/main" xmlns:r="http://schemas.openxmlformats.org/officeDocument/2006/relationships" xmlns:p="http://schemas.openxmlformats.org/presentationml/2006/main">
+<p:sld xmlns:a="http://schemas.openxmlformats.org/drawingml/2006/main" xmlns:r="http://schemas.openxmlformats.org/officeDocument/2006/relationships" xmlns:p="http://schemas.openxmlformats.org/presentationml/2006/main" showMasterSp="0">
   <p:cSld>
     <p:spTree>
       <p:nvGrpSpPr>
@@ -12368,7 +12379,7 @@
 </file>
 
 <file path=ppt/slides/slide17.xml><?xml version="1.0" encoding="utf-8"?>
-<p:sld xmlns:a="http://schemas.openxmlformats.org/drawingml/2006/main" xmlns:r="http://schemas.openxmlformats.org/officeDocument/2006/relationships" xmlns:p="http://schemas.openxmlformats.org/presentationml/2006/main">
+<p:sld xmlns:a="http://schemas.openxmlformats.org/drawingml/2006/main" xmlns:r="http://schemas.openxmlformats.org/officeDocument/2006/relationships" xmlns:p="http://schemas.openxmlformats.org/presentationml/2006/main" showMasterSp="0">
   <p:cSld>
     <p:spTree>
       <p:nvGrpSpPr>
@@ -13684,7 +13695,7 @@
 </file>
 
 <file path=ppt/slides/slide18.xml><?xml version="1.0" encoding="utf-8"?>
-<p:sld xmlns:a="http://schemas.openxmlformats.org/drawingml/2006/main" xmlns:r="http://schemas.openxmlformats.org/officeDocument/2006/relationships" xmlns:p="http://schemas.openxmlformats.org/presentationml/2006/main">
+<p:sld xmlns:a="http://schemas.openxmlformats.org/drawingml/2006/main" xmlns:r="http://schemas.openxmlformats.org/officeDocument/2006/relationships" xmlns:p="http://schemas.openxmlformats.org/presentationml/2006/main" showMasterSp="0">
   <p:cSld>
     <p:spTree>
       <p:nvGrpSpPr>
@@ -15144,7 +15155,7 @@
 </file>
 
 <file path=ppt/slides/slide19.xml><?xml version="1.0" encoding="utf-8"?>
-<p:sld xmlns:a="http://schemas.openxmlformats.org/drawingml/2006/main" xmlns:r="http://schemas.openxmlformats.org/officeDocument/2006/relationships" xmlns:p="http://schemas.openxmlformats.org/presentationml/2006/main">
+<p:sld xmlns:a="http://schemas.openxmlformats.org/drawingml/2006/main" xmlns:r="http://schemas.openxmlformats.org/officeDocument/2006/relationships" xmlns:p="http://schemas.openxmlformats.org/presentationml/2006/main" showMasterSp="0">
   <p:cSld>
     <p:spTree>
       <p:nvGrpSpPr>
@@ -16731,7 +16742,7 @@
           <a:lstStyle/>
           <a:p>
             <a:r>
-              <a:rPr lang="en-US" altLang="ko-KR" sz="2500" spc="-150">
+              <a:rPr lang="en-US" altLang="ko-KR" sz="2500" spc="-150" dirty="0">
                 <a:solidFill>
                   <a:schemeClr val="bg1"/>
                 </a:solidFill>
@@ -16742,7 +16753,7 @@
             </a:r>
           </a:p>
           <a:p>
-            <a:endParaRPr lang="en-US" altLang="ko-KR" sz="2500" spc="-150">
+            <a:endParaRPr lang="en-US" altLang="ko-KR" sz="2500" spc="-150" dirty="0">
               <a:solidFill>
                 <a:schemeClr val="bg1"/>
               </a:solidFill>
@@ -16752,7 +16763,7 @@
           </a:p>
           <a:p>
             <a:r>
-              <a:rPr lang="en-US" altLang="ko-KR" sz="2500" spc="-150">
+              <a:rPr lang="en-US" altLang="ko-KR" sz="2500" spc="-150" dirty="0">
                 <a:solidFill>
                   <a:schemeClr val="bg1"/>
                 </a:solidFill>
@@ -16763,7 +16774,7 @@
             </a:r>
           </a:p>
           <a:p>
-            <a:endParaRPr lang="en-US" altLang="ko-KR" sz="2500" spc="-150">
+            <a:endParaRPr lang="en-US" altLang="ko-KR" sz="2500" spc="-150" dirty="0">
               <a:solidFill>
                 <a:schemeClr val="bg1"/>
               </a:solidFill>
@@ -16773,18 +16784,18 @@
           </a:p>
           <a:p>
             <a:r>
-              <a:rPr lang="en-US" altLang="ko-KR" sz="2500" spc="-150">
+              <a:rPr lang="en-US" altLang="ko-KR" sz="2500" spc="-150" dirty="0">
                 <a:solidFill>
                   <a:schemeClr val="bg1"/>
                 </a:solidFill>
                 <a:latin typeface="+mj-lt"/>
                 <a:ea typeface="+mj-ea"/>
               </a:rPr>
-              <a:t>schedule</a:t>
+              <a:t>Schedule</a:t>
             </a:r>
           </a:p>
           <a:p>
-            <a:endParaRPr lang="en-US" altLang="ko-KR" sz="2500" spc="-150">
+            <a:endParaRPr lang="en-US" altLang="ko-KR" sz="2500" spc="-150" dirty="0">
               <a:solidFill>
                 <a:schemeClr val="bg1"/>
               </a:solidFill>
@@ -16794,7 +16805,7 @@
           </a:p>
           <a:p>
             <a:r>
-              <a:rPr lang="en-US" altLang="ko-KR" sz="2500" spc="-150">
+              <a:rPr lang="en-US" altLang="ko-KR" sz="2500" spc="-150" dirty="0">
                 <a:solidFill>
                   <a:schemeClr val="bg1"/>
                 </a:solidFill>
@@ -17000,7 +17011,7 @@
 </file>
 
 <file path=ppt/slides/slide20.xml><?xml version="1.0" encoding="utf-8"?>
-<p:sld xmlns:a="http://schemas.openxmlformats.org/drawingml/2006/main" xmlns:r="http://schemas.openxmlformats.org/officeDocument/2006/relationships" xmlns:p="http://schemas.openxmlformats.org/presentationml/2006/main">
+<p:sld xmlns:a="http://schemas.openxmlformats.org/drawingml/2006/main" xmlns:r="http://schemas.openxmlformats.org/officeDocument/2006/relationships" xmlns:p="http://schemas.openxmlformats.org/presentationml/2006/main" showMasterSp="0">
   <p:cSld>
     <p:spTree>
       <p:nvGrpSpPr>
@@ -17344,7 +17355,7 @@
 </file>
 
 <file path=ppt/slides/slide21.xml><?xml version="1.0" encoding="utf-8"?>
-<p:sld xmlns:a="http://schemas.openxmlformats.org/drawingml/2006/main" xmlns:r="http://schemas.openxmlformats.org/officeDocument/2006/relationships" xmlns:p="http://schemas.openxmlformats.org/presentationml/2006/main">
+<p:sld xmlns:a="http://schemas.openxmlformats.org/drawingml/2006/main" xmlns:r="http://schemas.openxmlformats.org/officeDocument/2006/relationships" xmlns:p="http://schemas.openxmlformats.org/presentationml/2006/main" showMasterSp="0">
   <p:cSld>
     <p:spTree>
       <p:nvGrpSpPr>
@@ -17945,10 +17956,147 @@
           </a:p>
         </p:txBody>
       </p:sp>
+      <p:pic>
+        <p:nvPicPr>
+          <p:cNvPr id="3" name="그림 2">
+            <a:extLst>
+              <a:ext uri="{FF2B5EF4-FFF2-40B4-BE49-F238E27FC236}">
+                <a16:creationId xmlns:a16="http://schemas.microsoft.com/office/drawing/2014/main" id="{EB861A46-9FC4-4F96-A48C-0E1E3CF85340}"/>
+              </a:ext>
+            </a:extLst>
+          </p:cNvPr>
+          <p:cNvPicPr>
+            <a:picLocks noChangeAspect="1"/>
+          </p:cNvPicPr>
+          <p:nvPr/>
+        </p:nvPicPr>
+        <p:blipFill>
+          <a:blip r:embed="rId2"/>
+          <a:stretch>
+            <a:fillRect/>
+          </a:stretch>
+        </p:blipFill>
+        <p:spPr>
+          <a:xfrm>
+            <a:off x="1814512" y="2263959"/>
+            <a:ext cx="8562975" cy="2543175"/>
+          </a:xfrm>
+          <a:prstGeom prst="rect">
+            <a:avLst/>
+          </a:prstGeom>
+        </p:spPr>
+      </p:pic>
+      <p:sp>
+        <p:nvSpPr>
+          <p:cNvPr id="5" name="TextBox 4">
+            <a:extLst>
+              <a:ext uri="{FF2B5EF4-FFF2-40B4-BE49-F238E27FC236}">
+                <a16:creationId xmlns:a16="http://schemas.microsoft.com/office/drawing/2014/main" id="{16B2A61A-FDEA-4D5C-9FD2-BFDB9EA29241}"/>
+              </a:ext>
+            </a:extLst>
+          </p:cNvPr>
+          <p:cNvSpPr txBox="1"/>
+          <p:nvPr/>
+        </p:nvSpPr>
+        <p:spPr>
+          <a:xfrm>
+            <a:off x="1188881" y="1322632"/>
+            <a:ext cx="4607352" cy="630942"/>
+          </a:xfrm>
+          <a:prstGeom prst="rect">
+            <a:avLst/>
+          </a:prstGeom>
+          <a:noFill/>
+        </p:spPr>
+        <p:txBody>
+          <a:bodyPr wrap="none" rtlCol="0">
+            <a:spAutoFit/>
+          </a:bodyPr>
+          <a:lstStyle/>
+          <a:p>
+            <a:r>
+              <a:rPr lang="en-US" altLang="ko-KR" sz="3500" dirty="0"/>
+              <a:t>1. One-Stage Method </a:t>
+            </a:r>
+          </a:p>
+        </p:txBody>
+      </p:sp>
+      <p:sp>
+        <p:nvSpPr>
+          <p:cNvPr id="6" name="TextBox 5">
+            <a:extLst>
+              <a:ext uri="{FF2B5EF4-FFF2-40B4-BE49-F238E27FC236}">
+                <a16:creationId xmlns:a16="http://schemas.microsoft.com/office/drawing/2014/main" id="{29BD78EC-28B3-463B-9951-1CB405BE6605}"/>
+              </a:ext>
+            </a:extLst>
+          </p:cNvPr>
+          <p:cNvSpPr txBox="1"/>
+          <p:nvPr/>
+        </p:nvSpPr>
+        <p:spPr>
+          <a:xfrm>
+            <a:off x="4882718" y="5007188"/>
+            <a:ext cx="2143407" cy="861774"/>
+          </a:xfrm>
+          <a:prstGeom prst="rect">
+            <a:avLst/>
+          </a:prstGeom>
+          <a:noFill/>
+        </p:spPr>
+        <p:txBody>
+          <a:bodyPr wrap="none" rtlCol="0">
+            <a:spAutoFit/>
+          </a:bodyPr>
+          <a:lstStyle/>
+          <a:p>
+            <a:r>
+              <a:rPr lang="en-US" altLang="ko-KR" sz="5000" dirty="0"/>
+              <a:t>FAST!!</a:t>
+            </a:r>
+            <a:endParaRPr lang="ko-KR" altLang="en-US" sz="5000" dirty="0"/>
+          </a:p>
+        </p:txBody>
+      </p:sp>
+      <p:sp>
+        <p:nvSpPr>
+          <p:cNvPr id="8" name="TextBox 7">
+            <a:extLst>
+              <a:ext uri="{FF2B5EF4-FFF2-40B4-BE49-F238E27FC236}">
+                <a16:creationId xmlns:a16="http://schemas.microsoft.com/office/drawing/2014/main" id="{9BB7731C-A934-4F33-8D8A-42DA00B77E11}"/>
+              </a:ext>
+            </a:extLst>
+          </p:cNvPr>
+          <p:cNvSpPr txBox="1"/>
+          <p:nvPr/>
+        </p:nvSpPr>
+        <p:spPr>
+          <a:xfrm>
+            <a:off x="7785716" y="1791517"/>
+            <a:ext cx="2522485" cy="477054"/>
+          </a:xfrm>
+          <a:prstGeom prst="rect">
+            <a:avLst/>
+          </a:prstGeom>
+          <a:noFill/>
+        </p:spPr>
+        <p:txBody>
+          <a:bodyPr wrap="none" rtlCol="0">
+            <a:spAutoFit/>
+          </a:bodyPr>
+          <a:lstStyle/>
+          <a:p>
+            <a:r>
+              <a:rPr lang="en-US" altLang="ko-KR" sz="2500" dirty="0"/>
+              <a:t>ex&gt; YOLO, SSD</a:t>
+            </a:r>
+            <a:endParaRPr lang="ko-KR" altLang="en-US" sz="2500" dirty="0"/>
+          </a:p>
+        </p:txBody>
+      </p:sp>
     </p:spTree>
     <p:extLst>
       <p:ext uri="{BB962C8B-B14F-4D97-AF65-F5344CB8AC3E}">
-        <p14:creationId xmlns:p14="http://schemas.microsoft.com/office/powerpoint/2010/main" val="738605602"/>
+        <p14:creationId xmlns:p14="http://schemas.microsoft.com/office/powerpoint/2010/main" val="4215194051"/>
       </p:ext>
     </p:extLst>
   </p:cSld>
@@ -18208,10 +18356,147 @@
           </a:p>
         </p:txBody>
       </p:sp>
+      <p:pic>
+        <p:nvPicPr>
+          <p:cNvPr id="4" name="그림 3">
+            <a:extLst>
+              <a:ext uri="{FF2B5EF4-FFF2-40B4-BE49-F238E27FC236}">
+                <a16:creationId xmlns:a16="http://schemas.microsoft.com/office/drawing/2014/main" id="{C4DDC251-80BF-4399-AF01-3E7DEEDD6A4F}"/>
+              </a:ext>
+            </a:extLst>
+          </p:cNvPr>
+          <p:cNvPicPr>
+            <a:picLocks noChangeAspect="1"/>
+          </p:cNvPicPr>
+          <p:nvPr/>
+        </p:nvPicPr>
+        <p:blipFill>
+          <a:blip r:embed="rId2"/>
+          <a:stretch>
+            <a:fillRect/>
+          </a:stretch>
+        </p:blipFill>
+        <p:spPr>
+          <a:xfrm>
+            <a:off x="2059729" y="2263959"/>
+            <a:ext cx="4349949" cy="3511886"/>
+          </a:xfrm>
+          <a:prstGeom prst="rect">
+            <a:avLst/>
+          </a:prstGeom>
+        </p:spPr>
+      </p:pic>
+      <p:sp>
+        <p:nvSpPr>
+          <p:cNvPr id="2" name="TextBox 1">
+            <a:extLst>
+              <a:ext uri="{FF2B5EF4-FFF2-40B4-BE49-F238E27FC236}">
+                <a16:creationId xmlns:a16="http://schemas.microsoft.com/office/drawing/2014/main" id="{3E075403-86C5-4E86-AE2C-CB104F45CC71}"/>
+              </a:ext>
+            </a:extLst>
+          </p:cNvPr>
+          <p:cNvSpPr txBox="1"/>
+          <p:nvPr/>
+        </p:nvSpPr>
+        <p:spPr>
+          <a:xfrm>
+            <a:off x="7119892" y="3429000"/>
+            <a:ext cx="4599336" cy="861774"/>
+          </a:xfrm>
+          <a:prstGeom prst="rect">
+            <a:avLst/>
+          </a:prstGeom>
+          <a:noFill/>
+        </p:spPr>
+        <p:txBody>
+          <a:bodyPr wrap="none" rtlCol="0">
+            <a:spAutoFit/>
+          </a:bodyPr>
+          <a:lstStyle/>
+          <a:p>
+            <a:r>
+              <a:rPr lang="en-US" altLang="ko-KR" sz="5000" dirty="0"/>
+              <a:t>High accuracy!!</a:t>
+            </a:r>
+            <a:endParaRPr lang="ko-KR" altLang="en-US" sz="5000" dirty="0"/>
+          </a:p>
+        </p:txBody>
+      </p:sp>
+      <p:sp>
+        <p:nvSpPr>
+          <p:cNvPr id="13" name="TextBox 12">
+            <a:extLst>
+              <a:ext uri="{FF2B5EF4-FFF2-40B4-BE49-F238E27FC236}">
+                <a16:creationId xmlns:a16="http://schemas.microsoft.com/office/drawing/2014/main" id="{48131774-A36E-46CF-9868-0DC6D81730A7}"/>
+              </a:ext>
+            </a:extLst>
+          </p:cNvPr>
+          <p:cNvSpPr txBox="1"/>
+          <p:nvPr/>
+        </p:nvSpPr>
+        <p:spPr>
+          <a:xfrm>
+            <a:off x="1188881" y="1322632"/>
+            <a:ext cx="4572919" cy="630942"/>
+          </a:xfrm>
+          <a:prstGeom prst="rect">
+            <a:avLst/>
+          </a:prstGeom>
+          <a:noFill/>
+        </p:spPr>
+        <p:txBody>
+          <a:bodyPr wrap="none" rtlCol="0">
+            <a:spAutoFit/>
+          </a:bodyPr>
+          <a:lstStyle/>
+          <a:p>
+            <a:r>
+              <a:rPr lang="en-US" altLang="ko-KR" sz="3500" dirty="0"/>
+              <a:t>2. Two-Stage Method </a:t>
+            </a:r>
+          </a:p>
+        </p:txBody>
+      </p:sp>
+      <p:sp>
+        <p:nvSpPr>
+          <p:cNvPr id="14" name="TextBox 13">
+            <a:extLst>
+              <a:ext uri="{FF2B5EF4-FFF2-40B4-BE49-F238E27FC236}">
+                <a16:creationId xmlns:a16="http://schemas.microsoft.com/office/drawing/2014/main" id="{C34D5390-080C-498F-B0EA-CD3FD61C994E}"/>
+              </a:ext>
+            </a:extLst>
+          </p:cNvPr>
+          <p:cNvSpPr txBox="1"/>
+          <p:nvPr/>
+        </p:nvSpPr>
+        <p:spPr>
+          <a:xfrm>
+            <a:off x="1357918" y="5907005"/>
+            <a:ext cx="5963492" cy="477054"/>
+          </a:xfrm>
+          <a:prstGeom prst="rect">
+            <a:avLst/>
+          </a:prstGeom>
+          <a:noFill/>
+        </p:spPr>
+        <p:txBody>
+          <a:bodyPr wrap="none" rtlCol="0">
+            <a:spAutoFit/>
+          </a:bodyPr>
+          <a:lstStyle/>
+          <a:p>
+            <a:r>
+              <a:rPr lang="en-US" altLang="ko-KR" sz="2500" dirty="0"/>
+              <a:t>ex&gt; R-CNN, Fast R-CNN, Faster R-CNN</a:t>
+            </a:r>
+            <a:endParaRPr lang="ko-KR" altLang="en-US" sz="2500" dirty="0"/>
+          </a:p>
+        </p:txBody>
+      </p:sp>
     </p:spTree>
     <p:extLst>
       <p:ext uri="{BB962C8B-B14F-4D97-AF65-F5344CB8AC3E}">
-        <p14:creationId xmlns:p14="http://schemas.microsoft.com/office/powerpoint/2010/main" val="1829425193"/>
+        <p14:creationId xmlns:p14="http://schemas.microsoft.com/office/powerpoint/2010/main" val="2264416548"/>
       </p:ext>
     </p:extLst>
   </p:cSld>
@@ -18471,10 +18756,75 @@
           </a:p>
         </p:txBody>
       </p:sp>
+      <p:sp>
+        <p:nvSpPr>
+          <p:cNvPr id="13" name="TextBox 12">
+            <a:extLst>
+              <a:ext uri="{FF2B5EF4-FFF2-40B4-BE49-F238E27FC236}">
+                <a16:creationId xmlns:a16="http://schemas.microsoft.com/office/drawing/2014/main" id="{48131774-A36E-46CF-9868-0DC6D81730A7}"/>
+              </a:ext>
+            </a:extLst>
+          </p:cNvPr>
+          <p:cNvSpPr txBox="1"/>
+          <p:nvPr/>
+        </p:nvSpPr>
+        <p:spPr>
+          <a:xfrm>
+            <a:off x="1188881" y="1322632"/>
+            <a:ext cx="3710631" cy="630942"/>
+          </a:xfrm>
+          <a:prstGeom prst="rect">
+            <a:avLst/>
+          </a:prstGeom>
+          <a:noFill/>
+        </p:spPr>
+        <p:txBody>
+          <a:bodyPr wrap="none" rtlCol="0">
+            <a:spAutoFit/>
+          </a:bodyPr>
+          <a:lstStyle/>
+          <a:p>
+            <a:r>
+              <a:rPr lang="en-US" altLang="ko-KR" sz="3500" dirty="0"/>
+              <a:t>Time Comparison</a:t>
+            </a:r>
+          </a:p>
+        </p:txBody>
+      </p:sp>
+      <p:pic>
+        <p:nvPicPr>
+          <p:cNvPr id="3" name="그림 2">
+            <a:extLst>
+              <a:ext uri="{FF2B5EF4-FFF2-40B4-BE49-F238E27FC236}">
+                <a16:creationId xmlns:a16="http://schemas.microsoft.com/office/drawing/2014/main" id="{D248B499-AD08-4809-B5A1-3FE279CED889}"/>
+              </a:ext>
+            </a:extLst>
+          </p:cNvPr>
+          <p:cNvPicPr>
+            <a:picLocks noChangeAspect="1"/>
+          </p:cNvPicPr>
+          <p:nvPr/>
+        </p:nvPicPr>
+        <p:blipFill>
+          <a:blip r:embed="rId2"/>
+          <a:stretch>
+            <a:fillRect/>
+          </a:stretch>
+        </p:blipFill>
+        <p:spPr>
+          <a:xfrm>
+            <a:off x="2095500" y="2174891"/>
+            <a:ext cx="8001000" cy="3857625"/>
+          </a:xfrm>
+          <a:prstGeom prst="rect">
+            <a:avLst/>
+          </a:prstGeom>
+        </p:spPr>
+      </p:pic>
     </p:spTree>
     <p:extLst>
       <p:ext uri="{BB962C8B-B14F-4D97-AF65-F5344CB8AC3E}">
-        <p14:creationId xmlns:p14="http://schemas.microsoft.com/office/powerpoint/2010/main" val="2206568949"/>
+        <p14:creationId xmlns:p14="http://schemas.microsoft.com/office/powerpoint/2010/main" val="959452960"/>
       </p:ext>
     </p:extLst>
   </p:cSld>
@@ -18501,6 +18851,391 @@
           <a:chExt cx="0" cy="0"/>
         </a:xfrm>
       </p:grpSpPr>
+      <p:cxnSp>
+        <p:nvCxnSpPr>
+          <p:cNvPr id="12" name="직선 연결선 11"/>
+          <p:cNvCxnSpPr/>
+          <p:nvPr/>
+        </p:nvCxnSpPr>
+        <p:spPr>
+          <a:xfrm>
+            <a:off x="1138986" y="245110"/>
+            <a:ext cx="10666421" cy="0"/>
+          </a:xfrm>
+          <a:prstGeom prst="line">
+            <a:avLst/>
+          </a:prstGeom>
+          <a:ln w="19050">
+            <a:solidFill>
+              <a:schemeClr val="accent6"/>
+            </a:solidFill>
+          </a:ln>
+        </p:spPr>
+        <p:style>
+          <a:lnRef idx="1">
+            <a:schemeClr val="accent1"/>
+          </a:lnRef>
+          <a:fillRef idx="0">
+            <a:schemeClr val="accent1"/>
+          </a:fillRef>
+          <a:effectRef idx="0">
+            <a:schemeClr val="accent1"/>
+          </a:effectRef>
+          <a:fontRef idx="minor">
+            <a:schemeClr val="tx1"/>
+          </a:fontRef>
+        </p:style>
+      </p:cxnSp>
+      <p:sp>
+        <p:nvSpPr>
+          <p:cNvPr id="45" name="직사각형 44">
+            <a:extLst>
+              <a:ext uri="{FF2B5EF4-FFF2-40B4-BE49-F238E27FC236}">
+                <a16:creationId xmlns:a16="http://schemas.microsoft.com/office/drawing/2014/main" id="{56E4506C-A54F-4F01-BE04-624ECD0E5DEA}"/>
+              </a:ext>
+            </a:extLst>
+          </p:cNvPr>
+          <p:cNvSpPr/>
+          <p:nvPr/>
+        </p:nvSpPr>
+        <p:spPr>
+          <a:xfrm>
+            <a:off x="265814" y="244548"/>
+            <a:ext cx="720000" cy="720000"/>
+          </a:xfrm>
+          <a:prstGeom prst="rect">
+            <a:avLst/>
+          </a:prstGeom>
+          <a:solidFill>
+            <a:schemeClr val="accent6">
+              <a:lumMod val="60000"/>
+              <a:lumOff val="40000"/>
+            </a:schemeClr>
+          </a:solidFill>
+          <a:ln>
+            <a:noFill/>
+          </a:ln>
+        </p:spPr>
+        <p:style>
+          <a:lnRef idx="2">
+            <a:schemeClr val="accent1">
+              <a:shade val="50000"/>
+            </a:schemeClr>
+          </a:lnRef>
+          <a:fillRef idx="1">
+            <a:schemeClr val="accent1"/>
+          </a:fillRef>
+          <a:effectRef idx="0">
+            <a:schemeClr val="accent1"/>
+          </a:effectRef>
+          <a:fontRef idx="minor">
+            <a:schemeClr val="lt1"/>
+          </a:fontRef>
+        </p:style>
+        <p:txBody>
+          <a:bodyPr rot="0" spcFirstLastPara="0" vertOverflow="overflow" horzOverflow="overflow" vert="horz" wrap="square" lIns="91440" tIns="45720" rIns="91440" bIns="45720" numCol="1" spcCol="0" rtlCol="0" fromWordArt="0" anchor="ctr" anchorCtr="0" forceAA="0" compatLnSpc="1">
+            <a:prstTxWarp prst="textNoShape">
+              <a:avLst/>
+            </a:prstTxWarp>
+            <a:noAutofit/>
+          </a:bodyPr>
+          <a:lstStyle/>
+          <a:p>
+            <a:pPr algn="ctr"/>
+            <a:endParaRPr lang="ko-KR" altLang="en-US"/>
+          </a:p>
+        </p:txBody>
+      </p:sp>
+      <p:grpSp>
+        <p:nvGrpSpPr>
+          <p:cNvPr id="46" name="그룹 45">
+            <a:extLst>
+              <a:ext uri="{FF2B5EF4-FFF2-40B4-BE49-F238E27FC236}">
+                <a16:creationId xmlns:a16="http://schemas.microsoft.com/office/drawing/2014/main" id="{E883E91C-C924-4913-9815-8457E1C1371F}"/>
+              </a:ext>
+            </a:extLst>
+          </p:cNvPr>
+          <p:cNvGrpSpPr/>
+          <p:nvPr/>
+        </p:nvGrpSpPr>
+        <p:grpSpPr>
+          <a:xfrm>
+            <a:off x="1188881" y="351819"/>
+            <a:ext cx="2132315" cy="660429"/>
+            <a:chOff x="1188881" y="351819"/>
+            <a:chExt cx="2132315" cy="660429"/>
+          </a:xfrm>
+        </p:grpSpPr>
+        <p:sp>
+          <p:nvSpPr>
+            <p:cNvPr id="47" name="TextBox 46">
+              <a:extLst>
+                <a:ext uri="{FF2B5EF4-FFF2-40B4-BE49-F238E27FC236}">
+                  <a16:creationId xmlns:a16="http://schemas.microsoft.com/office/drawing/2014/main" id="{4A8AB4A5-0109-4A5C-ADFD-9D504B7E03C3}"/>
+                </a:ext>
+              </a:extLst>
+            </p:cNvPr>
+            <p:cNvSpPr txBox="1"/>
+            <p:nvPr/>
+          </p:nvSpPr>
+          <p:spPr>
+            <a:xfrm>
+              <a:off x="1188881" y="351819"/>
+              <a:ext cx="798617" cy="276999"/>
+            </a:xfrm>
+            <a:prstGeom prst="rect">
+              <a:avLst/>
+            </a:prstGeom>
+            <a:noFill/>
+          </p:spPr>
+          <p:txBody>
+            <a:bodyPr wrap="none" rtlCol="0">
+              <a:spAutoFit/>
+            </a:bodyPr>
+            <a:lstStyle/>
+            <a:p>
+              <a:r>
+                <a:rPr lang="en-US" altLang="ko-KR" sz="1200" dirty="0"/>
+                <a:t>Progress</a:t>
+              </a:r>
+              <a:endParaRPr lang="ko-KR" altLang="en-US" sz="1200" dirty="0"/>
+            </a:p>
+          </p:txBody>
+        </p:sp>
+        <p:sp>
+          <p:nvSpPr>
+            <p:cNvPr id="48" name="TextBox 47">
+              <a:extLst>
+                <a:ext uri="{FF2B5EF4-FFF2-40B4-BE49-F238E27FC236}">
+                  <a16:creationId xmlns:a16="http://schemas.microsoft.com/office/drawing/2014/main" id="{CFED76E5-0E4D-4DBE-97E5-95C1D936719F}"/>
+                </a:ext>
+              </a:extLst>
+            </p:cNvPr>
+            <p:cNvSpPr txBox="1"/>
+            <p:nvPr/>
+          </p:nvSpPr>
+          <p:spPr>
+            <a:xfrm>
+              <a:off x="1188881" y="581361"/>
+              <a:ext cx="2132315" cy="430887"/>
+            </a:xfrm>
+            <a:prstGeom prst="rect">
+              <a:avLst/>
+            </a:prstGeom>
+            <a:noFill/>
+          </p:spPr>
+          <p:txBody>
+            <a:bodyPr wrap="none" rtlCol="0">
+              <a:spAutoFit/>
+            </a:bodyPr>
+            <a:lstStyle/>
+            <a:p>
+              <a:r>
+                <a:rPr lang="en-US" altLang="ko-KR" sz="2200" dirty="0"/>
+                <a:t>Learning Model</a:t>
+              </a:r>
+              <a:endParaRPr lang="ko-KR" altLang="en-US" sz="2200" dirty="0"/>
+            </a:p>
+          </p:txBody>
+        </p:sp>
+      </p:grpSp>
+      <p:sp>
+        <p:nvSpPr>
+          <p:cNvPr id="49" name="TextBox 48">
+            <a:extLst>
+              <a:ext uri="{FF2B5EF4-FFF2-40B4-BE49-F238E27FC236}">
+                <a16:creationId xmlns:a16="http://schemas.microsoft.com/office/drawing/2014/main" id="{9E4F56A2-4D8D-48AC-8485-013341ACC163}"/>
+              </a:ext>
+            </a:extLst>
+          </p:cNvPr>
+          <p:cNvSpPr txBox="1"/>
+          <p:nvPr/>
+        </p:nvSpPr>
+        <p:spPr>
+          <a:xfrm>
+            <a:off x="490138" y="323244"/>
+            <a:ext cx="259302" cy="584775"/>
+          </a:xfrm>
+          <a:prstGeom prst="rect">
+            <a:avLst/>
+          </a:prstGeom>
+          <a:noFill/>
+        </p:spPr>
+        <p:txBody>
+          <a:bodyPr wrap="square" rtlCol="0">
+            <a:spAutoFit/>
+          </a:bodyPr>
+          <a:lstStyle/>
+          <a:p>
+            <a:pPr algn="ctr"/>
+            <a:r>
+              <a:rPr lang="en-US" altLang="ko-KR" sz="3200" b="1" dirty="0">
+                <a:solidFill>
+                  <a:schemeClr val="bg1"/>
+                </a:solidFill>
+              </a:rPr>
+              <a:t>2</a:t>
+            </a:r>
+            <a:endParaRPr lang="ko-KR" altLang="en-US" sz="3200" b="1" dirty="0">
+              <a:solidFill>
+                <a:schemeClr val="bg1"/>
+              </a:solidFill>
+            </a:endParaRPr>
+          </a:p>
+        </p:txBody>
+      </p:sp>
+      <p:sp>
+        <p:nvSpPr>
+          <p:cNvPr id="13" name="TextBox 12">
+            <a:extLst>
+              <a:ext uri="{FF2B5EF4-FFF2-40B4-BE49-F238E27FC236}">
+                <a16:creationId xmlns:a16="http://schemas.microsoft.com/office/drawing/2014/main" id="{48131774-A36E-46CF-9868-0DC6D81730A7}"/>
+              </a:ext>
+            </a:extLst>
+          </p:cNvPr>
+          <p:cNvSpPr txBox="1"/>
+          <p:nvPr/>
+        </p:nvSpPr>
+        <p:spPr>
+          <a:xfrm>
+            <a:off x="1188881" y="1322632"/>
+            <a:ext cx="3710631" cy="630942"/>
+          </a:xfrm>
+          <a:prstGeom prst="rect">
+            <a:avLst/>
+          </a:prstGeom>
+          <a:noFill/>
+        </p:spPr>
+        <p:txBody>
+          <a:bodyPr wrap="none" rtlCol="0">
+            <a:spAutoFit/>
+          </a:bodyPr>
+          <a:lstStyle/>
+          <a:p>
+            <a:r>
+              <a:rPr lang="en-US" altLang="ko-KR" sz="3500" dirty="0"/>
+              <a:t>Time Comparison</a:t>
+            </a:r>
+          </a:p>
+        </p:txBody>
+      </p:sp>
+      <p:pic>
+        <p:nvPicPr>
+          <p:cNvPr id="3" name="그림 2">
+            <a:extLst>
+              <a:ext uri="{FF2B5EF4-FFF2-40B4-BE49-F238E27FC236}">
+                <a16:creationId xmlns:a16="http://schemas.microsoft.com/office/drawing/2014/main" id="{D248B499-AD08-4809-B5A1-3FE279CED889}"/>
+              </a:ext>
+            </a:extLst>
+          </p:cNvPr>
+          <p:cNvPicPr>
+            <a:picLocks noChangeAspect="1"/>
+          </p:cNvPicPr>
+          <p:nvPr/>
+        </p:nvPicPr>
+        <p:blipFill>
+          <a:blip r:embed="rId2"/>
+          <a:stretch>
+            <a:fillRect/>
+          </a:stretch>
+        </p:blipFill>
+        <p:spPr>
+          <a:xfrm>
+            <a:off x="2095500" y="2174891"/>
+            <a:ext cx="8001000" cy="3857625"/>
+          </a:xfrm>
+          <a:prstGeom prst="rect">
+            <a:avLst/>
+          </a:prstGeom>
+        </p:spPr>
+      </p:pic>
+      <p:sp>
+        <p:nvSpPr>
+          <p:cNvPr id="2" name="직사각형 1">
+            <a:extLst>
+              <a:ext uri="{FF2B5EF4-FFF2-40B4-BE49-F238E27FC236}">
+                <a16:creationId xmlns:a16="http://schemas.microsoft.com/office/drawing/2014/main" id="{F8FC1B9D-2E12-47C6-9E63-8DCEE6DB3BC0}"/>
+              </a:ext>
+            </a:extLst>
+          </p:cNvPr>
+          <p:cNvSpPr/>
+          <p:nvPr/>
+        </p:nvSpPr>
+        <p:spPr>
+          <a:xfrm>
+            <a:off x="2592280" y="4864963"/>
+            <a:ext cx="1402671" cy="301841"/>
+          </a:xfrm>
+          <a:prstGeom prst="rect">
+            <a:avLst/>
+          </a:prstGeom>
+          <a:noFill/>
+          <a:ln w="38100">
+            <a:solidFill>
+              <a:srgbClr val="FF0000"/>
+            </a:solidFill>
+          </a:ln>
+        </p:spPr>
+        <p:style>
+          <a:lnRef idx="2">
+            <a:schemeClr val="accent1">
+              <a:shade val="50000"/>
+            </a:schemeClr>
+          </a:lnRef>
+          <a:fillRef idx="1">
+            <a:schemeClr val="accent1"/>
+          </a:fillRef>
+          <a:effectRef idx="0">
+            <a:schemeClr val="accent1"/>
+          </a:effectRef>
+          <a:fontRef idx="minor">
+            <a:schemeClr val="lt1"/>
+          </a:fontRef>
+        </p:style>
+        <p:txBody>
+          <a:bodyPr rot="0" spcFirstLastPara="0" vertOverflow="overflow" horzOverflow="overflow" vert="horz" wrap="square" lIns="91440" tIns="45720" rIns="91440" bIns="45720" numCol="1" spcCol="0" rtlCol="0" fromWordArt="0" anchor="ctr" anchorCtr="0" forceAA="0" compatLnSpc="1">
+            <a:prstTxWarp prst="textNoShape">
+              <a:avLst/>
+            </a:prstTxWarp>
+            <a:noAutofit/>
+          </a:bodyPr>
+          <a:lstStyle/>
+          <a:p>
+            <a:pPr algn="ctr"/>
+            <a:endParaRPr lang="ko-KR" altLang="en-US"/>
+          </a:p>
+        </p:txBody>
+      </p:sp>
+    </p:spTree>
+    <p:extLst>
+      <p:ext uri="{BB962C8B-B14F-4D97-AF65-F5344CB8AC3E}">
+        <p14:creationId xmlns:p14="http://schemas.microsoft.com/office/powerpoint/2010/main" val="3881482603"/>
+      </p:ext>
+    </p:extLst>
+  </p:cSld>
+  <p:clrMapOvr>
+    <a:masterClrMapping/>
+  </p:clrMapOvr>
+</p:sld>
+</file>
+
+<file path=ppt/slides/slide26.xml><?xml version="1.0" encoding="utf-8"?>
+<p:sld xmlns:a="http://schemas.openxmlformats.org/drawingml/2006/main" xmlns:r="http://schemas.openxmlformats.org/officeDocument/2006/relationships" xmlns:p="http://schemas.openxmlformats.org/presentationml/2006/main" showMasterSp="0">
+  <p:cSld>
+    <p:spTree>
+      <p:nvGrpSpPr>
+        <p:cNvPr id="1" name=""/>
+        <p:cNvGrpSpPr/>
+        <p:nvPr/>
+      </p:nvGrpSpPr>
+      <p:grpSpPr>
+        <a:xfrm>
+          <a:off x="0" y="0"/>
+          <a:ext cx="0" cy="0"/>
+          <a:chOff x="0" y="0"/>
+          <a:chExt cx="0" cy="0"/>
+        </a:xfrm>
+      </p:grpSpPr>
       <p:sp>
         <p:nvSpPr>
           <p:cNvPr id="6" name="TextBox 5"/>
@@ -18627,8 +19362,8 @@
 </p:sld>
 </file>
 
-<file path=ppt/slides/slide26.xml><?xml version="1.0" encoding="utf-8"?>
-<p:sld xmlns:a="http://schemas.openxmlformats.org/drawingml/2006/main" xmlns:r="http://schemas.openxmlformats.org/officeDocument/2006/relationships" xmlns:p="http://schemas.openxmlformats.org/presentationml/2006/main">
+<file path=ppt/slides/slide27.xml><?xml version="1.0" encoding="utf-8"?>
+<p:sld xmlns:a="http://schemas.openxmlformats.org/drawingml/2006/main" xmlns:r="http://schemas.openxmlformats.org/officeDocument/2006/relationships" xmlns:p="http://schemas.openxmlformats.org/presentationml/2006/main" showMasterSp="0">
   <p:cSld>
     <p:spTree>
       <p:nvGrpSpPr>
@@ -18836,8 +19571,8 @@
         </p:blipFill>
         <p:spPr>
           <a:xfrm>
-            <a:off x="2181340" y="1249196"/>
-            <a:ext cx="8058837" cy="5160479"/>
+            <a:off x="3187085" y="1204808"/>
+            <a:ext cx="6063448" cy="5160479"/>
           </a:xfrm>
           <a:prstGeom prst="rect">
             <a:avLst/>
@@ -18857,8 +19592,8 @@
 </p:sld>
 </file>
 
-<file path=ppt/slides/slide27.xml><?xml version="1.0" encoding="utf-8"?>
-<p:sld xmlns:a="http://schemas.openxmlformats.org/drawingml/2006/main" xmlns:r="http://schemas.openxmlformats.org/officeDocument/2006/relationships" xmlns:p="http://schemas.openxmlformats.org/presentationml/2006/main">
+<file path=ppt/slides/slide28.xml><?xml version="1.0" encoding="utf-8"?>
+<p:sld xmlns:a="http://schemas.openxmlformats.org/drawingml/2006/main" xmlns:r="http://schemas.openxmlformats.org/officeDocument/2006/relationships" xmlns:p="http://schemas.openxmlformats.org/presentationml/2006/main" showMasterSp="0">
   <p:cSld>
     <p:spTree>
       <p:nvGrpSpPr>
@@ -19147,8 +19882,8 @@
 </p:sld>
 </file>
 
-<file path=ppt/slides/slide28.xml><?xml version="1.0" encoding="utf-8"?>
-<p:sld xmlns:a="http://schemas.openxmlformats.org/drawingml/2006/main" xmlns:r="http://schemas.openxmlformats.org/officeDocument/2006/relationships" xmlns:p="http://schemas.openxmlformats.org/presentationml/2006/main">
+<file path=ppt/slides/slide29.xml><?xml version="1.0" encoding="utf-8"?>
+<p:sld xmlns:a="http://schemas.openxmlformats.org/drawingml/2006/main" xmlns:r="http://schemas.openxmlformats.org/officeDocument/2006/relationships" xmlns:p="http://schemas.openxmlformats.org/presentationml/2006/main" showMasterSp="0">
   <p:cSld>
     <p:spTree>
       <p:nvGrpSpPr>
@@ -19434,7 +20169,7 @@
 </file>
 
 <file path=ppt/slides/slide4.xml><?xml version="1.0" encoding="utf-8"?>
-<p:sld xmlns:a="http://schemas.openxmlformats.org/drawingml/2006/main" xmlns:r="http://schemas.openxmlformats.org/officeDocument/2006/relationships" xmlns:p="http://schemas.openxmlformats.org/presentationml/2006/main">
+<p:sld xmlns:a="http://schemas.openxmlformats.org/drawingml/2006/main" xmlns:r="http://schemas.openxmlformats.org/officeDocument/2006/relationships" xmlns:p="http://schemas.openxmlformats.org/presentationml/2006/main" showMasterSp="0">
   <p:cSld>
     <p:spTree>
       <p:nvGrpSpPr>
@@ -19681,10 +20416,14 @@
           <a:lstStyle/>
           <a:p>
             <a:r>
-              <a:rPr lang="en-US" altLang="ko-KR" sz="8000" dirty="0"/>
+              <a:rPr lang="en-US" altLang="ko-KR" sz="8000" dirty="0">
+                <a:latin typeface="Spoqa Han Sans"/>
+              </a:rPr>
               <a:t>Idea  vs  Model </a:t>
             </a:r>
-            <a:endParaRPr lang="ko-KR" altLang="en-US" sz="8000" dirty="0"/>
+            <a:endParaRPr lang="ko-KR" altLang="en-US" sz="8000" dirty="0">
+              <a:latin typeface="Spoqa Han Sans"/>
+            </a:endParaRPr>
           </a:p>
         </p:txBody>
       </p:sp>
@@ -19702,7 +20441,7 @@
 </file>
 
 <file path=ppt/slides/slide5.xml><?xml version="1.0" encoding="utf-8"?>
-<p:sld xmlns:a="http://schemas.openxmlformats.org/drawingml/2006/main" xmlns:r="http://schemas.openxmlformats.org/officeDocument/2006/relationships" xmlns:p="http://schemas.openxmlformats.org/presentationml/2006/main">
+<p:sld xmlns:a="http://schemas.openxmlformats.org/drawingml/2006/main" xmlns:r="http://schemas.openxmlformats.org/officeDocument/2006/relationships" xmlns:p="http://schemas.openxmlformats.org/presentationml/2006/main" showMasterSp="0">
   <p:cSld>
     <p:spTree>
       <p:nvGrpSpPr>
@@ -20004,7 +20743,7 @@
 </file>
 
 <file path=ppt/slides/slide6.xml><?xml version="1.0" encoding="utf-8"?>
-<p:sld xmlns:a="http://schemas.openxmlformats.org/drawingml/2006/main" xmlns:r="http://schemas.openxmlformats.org/officeDocument/2006/relationships" xmlns:p="http://schemas.openxmlformats.org/presentationml/2006/main">
+<p:sld xmlns:a="http://schemas.openxmlformats.org/drawingml/2006/main" xmlns:r="http://schemas.openxmlformats.org/officeDocument/2006/relationships" xmlns:p="http://schemas.openxmlformats.org/presentationml/2006/main" showMasterSp="0">
   <p:cSld>
     <p:spTree>
       <p:nvGrpSpPr>
@@ -20521,15 +21260,7 @@
           <a:p>
             <a:r>
               <a:rPr lang="en-US" altLang="ko-KR" sz="3600" dirty="0"/>
-              <a:t>Previous Topic : </a:t>
-            </a:r>
-            <a:r>
-              <a:rPr lang="en-US" altLang="ko-KR" sz="3600" dirty="0" err="1"/>
-              <a:t>Olgami</a:t>
-            </a:r>
-            <a:r>
-              <a:rPr lang="en-US" altLang="ko-KR" sz="3600" dirty="0"/>
-              <a:t> with some points</a:t>
+              <a:t>Previous Topic : Lasso with some points</a:t>
             </a:r>
             <a:endParaRPr lang="ko-KR" altLang="en-US" sz="3600" dirty="0"/>
           </a:p>
@@ -20549,7 +21280,7 @@
 </file>
 
 <file path=ppt/slides/slide8.xml><?xml version="1.0" encoding="utf-8"?>
-<p:sld xmlns:a="http://schemas.openxmlformats.org/drawingml/2006/main" xmlns:r="http://schemas.openxmlformats.org/officeDocument/2006/relationships" xmlns:p="http://schemas.openxmlformats.org/presentationml/2006/main">
+<p:sld xmlns:a="http://schemas.openxmlformats.org/drawingml/2006/main" xmlns:r="http://schemas.openxmlformats.org/officeDocument/2006/relationships" xmlns:p="http://schemas.openxmlformats.org/presentationml/2006/main" showMasterSp="0">
   <p:cSld>
     <p:spTree>
       <p:nvGrpSpPr>
@@ -20565,6 +21296,42 @@
           <a:chExt cx="0" cy="0"/>
         </a:xfrm>
       </p:grpSpPr>
+      <p:pic>
+        <p:nvPicPr>
+          <p:cNvPr id="4" name="그림 3">
+            <a:extLst>
+              <a:ext uri="{FF2B5EF4-FFF2-40B4-BE49-F238E27FC236}">
+                <a16:creationId xmlns:a16="http://schemas.microsoft.com/office/drawing/2014/main" id="{B0BBADC4-49AD-4A96-AA92-ABB9535F13D3}"/>
+              </a:ext>
+            </a:extLst>
+          </p:cNvPr>
+          <p:cNvPicPr>
+            <a:picLocks noChangeAspect="1"/>
+          </p:cNvPicPr>
+          <p:nvPr/>
+        </p:nvPicPr>
+        <p:blipFill>
+          <a:blip r:embed="rId2" cstate="print">
+            <a:extLst>
+              <a:ext uri="{28A0092B-C50C-407E-A947-70E740481C1C}">
+                <a14:useLocalDpi xmlns:a14="http://schemas.microsoft.com/office/drawing/2010/main" val="0"/>
+              </a:ext>
+            </a:extLst>
+          </a:blip>
+          <a:stretch>
+            <a:fillRect/>
+          </a:stretch>
+        </p:blipFill>
+        <p:spPr>
+          <a:xfrm>
+            <a:off x="481950" y="2647166"/>
+            <a:ext cx="1043392" cy="1043392"/>
+          </a:xfrm>
+          <a:prstGeom prst="rect">
+            <a:avLst/>
+          </a:prstGeom>
+        </p:spPr>
+      </p:pic>
       <p:cxnSp>
         <p:nvCxnSpPr>
           <p:cNvPr id="12" name="직선 연결선 11"/>
@@ -21042,7 +21809,7 @@
           <p:nvPr/>
         </p:nvPicPr>
         <p:blipFill>
-          <a:blip r:embed="rId2" cstate="print">
+          <a:blip r:embed="rId3" cstate="print">
             <a:extLst>
               <a:ext uri="{28A0092B-C50C-407E-A947-70E740481C1C}">
                 <a14:useLocalDpi xmlns:a14="http://schemas.microsoft.com/office/drawing/2010/main" val="0"/>
@@ -21071,8 +21838,8 @@
         </p:nvSpPr>
         <p:spPr>
           <a:xfrm>
-            <a:off x="907216" y="3347593"/>
-            <a:ext cx="1893467" cy="707886"/>
+            <a:off x="1411542" y="3614105"/>
+            <a:ext cx="1527049" cy="553998"/>
           </a:xfrm>
           <a:prstGeom prst="rect">
             <a:avLst/>
@@ -21080,13 +21847,13 @@
           <a:noFill/>
         </p:spPr>
         <p:txBody>
-          <a:bodyPr wrap="none" rtlCol="0">
+          <a:bodyPr wrap="square" rtlCol="0">
             <a:spAutoFit/>
           </a:bodyPr>
           <a:lstStyle/>
           <a:p>
             <a:r>
-              <a:rPr lang="en-US" altLang="ko-KR" sz="4000" b="1" dirty="0">
+              <a:rPr lang="en-US" altLang="ko-KR" sz="3000" b="1" dirty="0">
                 <a:effectLst>
                   <a:outerShdw blurRad="38100" dist="38100" dir="2700000" algn="tl">
                     <a:srgbClr val="000000">
@@ -21097,7 +21864,7 @@
               </a:rPr>
               <a:t>person</a:t>
             </a:r>
-            <a:endParaRPr lang="ko-KR" altLang="en-US" sz="4000" b="1" dirty="0">
+            <a:endParaRPr lang="ko-KR" altLang="en-US" sz="3000" b="1" dirty="0">
               <a:effectLst>
                 <a:outerShdw blurRad="38100" dist="38100" dir="2700000" algn="tl">
                   <a:srgbClr val="000000">
@@ -21106,6 +21873,67 @@
                 </a:outerShdw>
               </a:effectLst>
             </a:endParaRPr>
+          </a:p>
+        </p:txBody>
+      </p:sp>
+      <p:sp>
+        <p:nvSpPr>
+          <p:cNvPr id="7" name="십자형 6">
+            <a:extLst>
+              <a:ext uri="{FF2B5EF4-FFF2-40B4-BE49-F238E27FC236}">
+                <a16:creationId xmlns:a16="http://schemas.microsoft.com/office/drawing/2014/main" id="{7200BC5A-CC71-4DDC-A42B-E0C783F0DD7C}"/>
+              </a:ext>
+            </a:extLst>
+          </p:cNvPr>
+          <p:cNvSpPr/>
+          <p:nvPr/>
+        </p:nvSpPr>
+        <p:spPr>
+          <a:xfrm>
+            <a:off x="1364051" y="3203997"/>
+            <a:ext cx="571173" cy="571173"/>
+          </a:xfrm>
+          <a:prstGeom prst="plus">
+            <a:avLst>
+              <a:gd name="adj" fmla="val 38688"/>
+            </a:avLst>
+          </a:prstGeom>
+          <a:solidFill>
+            <a:schemeClr val="accent1">
+              <a:alpha val="70000"/>
+            </a:schemeClr>
+          </a:solidFill>
+          <a:ln>
+            <a:noFill/>
+          </a:ln>
+        </p:spPr>
+        <p:style>
+          <a:lnRef idx="2">
+            <a:schemeClr val="accent1">
+              <a:shade val="50000"/>
+            </a:schemeClr>
+          </a:lnRef>
+          <a:fillRef idx="1">
+            <a:schemeClr val="accent1"/>
+          </a:fillRef>
+          <a:effectRef idx="0">
+            <a:schemeClr val="accent1"/>
+          </a:effectRef>
+          <a:fontRef idx="minor">
+            <a:schemeClr val="lt1"/>
+          </a:fontRef>
+        </p:style>
+        <p:txBody>
+          <a:bodyPr rot="0" spcFirstLastPara="0" vertOverflow="overflow" horzOverflow="overflow" vert="horz" wrap="square" lIns="91440" tIns="45720" rIns="91440" bIns="45720" numCol="1" spcCol="0" rtlCol="0" fromWordArt="0" anchor="ctr" anchorCtr="0" forceAA="0" compatLnSpc="1">
+            <a:prstTxWarp prst="textNoShape">
+              <a:avLst/>
+            </a:prstTxWarp>
+            <a:noAutofit/>
+          </a:bodyPr>
+          <a:lstStyle/>
+          <a:p>
+            <a:pPr algn="ctr"/>
+            <a:endParaRPr lang="ko-KR" altLang="en-US"/>
           </a:p>
         </p:txBody>
       </p:sp>
@@ -21123,7 +21951,7 @@
 </file>
 
 <file path=ppt/slides/slide9.xml><?xml version="1.0" encoding="utf-8"?>
-<p:sld xmlns:a="http://schemas.openxmlformats.org/drawingml/2006/main" xmlns:r="http://schemas.openxmlformats.org/officeDocument/2006/relationships" xmlns:p="http://schemas.openxmlformats.org/presentationml/2006/main">
+<p:sld xmlns:a="http://schemas.openxmlformats.org/drawingml/2006/main" xmlns:r="http://schemas.openxmlformats.org/officeDocument/2006/relationships" xmlns:p="http://schemas.openxmlformats.org/presentationml/2006/main" showMasterSp="0">
   <p:cSld>
     <p:spTree>
       <p:nvGrpSpPr>

</xml_diff>